<commit_message>
Refactored the NN_model in the main Jnotebook file. Added the NN portion in the PPT, and also added the conclusion in the PPT
</commit_message>
<xml_diff>
--- a/Presentation.pptx
+++ b/Presentation.pptx
@@ -7,19 +7,23 @@
   <p:sldIdLst>
     <p:sldId id="256" r:id="rId2"/>
     <p:sldId id="257" r:id="rId3"/>
-    <p:sldId id="258" r:id="rId4"/>
-    <p:sldId id="259" r:id="rId5"/>
-    <p:sldId id="260" r:id="rId6"/>
-    <p:sldId id="261" r:id="rId7"/>
-    <p:sldId id="262" r:id="rId8"/>
-    <p:sldId id="263" r:id="rId9"/>
-    <p:sldId id="264" r:id="rId10"/>
-    <p:sldId id="265" r:id="rId11"/>
-    <p:sldId id="266" r:id="rId12"/>
-    <p:sldId id="267" r:id="rId13"/>
-    <p:sldId id="268" r:id="rId14"/>
-    <p:sldId id="269" r:id="rId15"/>
-    <p:sldId id="270" r:id="rId16"/>
+    <p:sldId id="271" r:id="rId4"/>
+    <p:sldId id="258" r:id="rId5"/>
+    <p:sldId id="259" r:id="rId6"/>
+    <p:sldId id="260" r:id="rId7"/>
+    <p:sldId id="261" r:id="rId8"/>
+    <p:sldId id="262" r:id="rId9"/>
+    <p:sldId id="263" r:id="rId10"/>
+    <p:sldId id="264" r:id="rId11"/>
+    <p:sldId id="265" r:id="rId12"/>
+    <p:sldId id="266" r:id="rId13"/>
+    <p:sldId id="267" r:id="rId14"/>
+    <p:sldId id="268" r:id="rId15"/>
+    <p:sldId id="269" r:id="rId16"/>
+    <p:sldId id="272" r:id="rId17"/>
+    <p:sldId id="273" r:id="rId18"/>
+    <p:sldId id="274" r:id="rId19"/>
+    <p:sldId id="270" r:id="rId20"/>
   </p:sldIdLst>
   <p:sldSz cx="12192000" cy="6858000"/>
   <p:notesSz cx="6858000" cy="9144000"/>
@@ -118,7 +122,259 @@
       </a:defRPr>
     </a:lvl9pPr>
   </p:defaultTextStyle>
+  <p:extLst>
+    <p:ext uri="{EFAFB233-063F-42B5-8137-9DF3F51BA10A}">
+      <p15:sldGuideLst xmlns:p15="http://schemas.microsoft.com/office/powerpoint/2012/main"/>
+    </p:ext>
+  </p:extLst>
 </p:presentation>
+</file>
+
+<file path=ppt/revisionInfo.xml><?xml version="1.0" encoding="utf-8"?>
+<p1510:revInfo xmlns:a="http://schemas.openxmlformats.org/drawingml/2006/main" xmlns:r="http://schemas.openxmlformats.org/officeDocument/2006/relationships" xmlns:p1510="http://schemas.microsoft.com/office/powerpoint/2015/10/main">
+  <p1510:revLst>
+    <p1510:client id="{CE53E717-A095-4B65-8F28-263D8246A9B1}" v="2" dt="2023-05-08T05:56:47.874"/>
+  </p1510:revLst>
+</p1510:revInfo>
+</file>
+
+<file path=ppt/changesInfos/changesInfo1.xml><?xml version="1.0" encoding="utf-8"?>
+<pc:chgInfo xmlns:a="http://schemas.openxmlformats.org/drawingml/2006/main" xmlns:r="http://schemas.openxmlformats.org/officeDocument/2006/relationships" xmlns:ac="http://schemas.microsoft.com/office/drawing/2013/main/command" xmlns:pc="http://schemas.microsoft.com/office/powerpoint/2013/main/command">
+  <pc:docChgLst>
+    <pc:chgData name="Phuong Dinh" userId="ff377d00173367d7" providerId="LiveId" clId="{CE53E717-A095-4B65-8F28-263D8246A9B1}"/>
+    <pc:docChg chg="undo custSel addSld delSld modSld sldOrd">
+      <pc:chgData name="Phuong Dinh" userId="ff377d00173367d7" providerId="LiveId" clId="{CE53E717-A095-4B65-8F28-263D8246A9B1}" dt="2023-05-08T05:57:11.128" v="1735" actId="1076"/>
+      <pc:docMkLst>
+        <pc:docMk/>
+      </pc:docMkLst>
+      <pc:sldChg chg="addSp delSp modSp mod">
+        <pc:chgData name="Phuong Dinh" userId="ff377d00173367d7" providerId="LiveId" clId="{CE53E717-A095-4B65-8F28-263D8246A9B1}" dt="2023-05-08T03:34:59.037" v="428" actId="1076"/>
+        <pc:sldMkLst>
+          <pc:docMk/>
+          <pc:sldMk cId="2329813189" sldId="269"/>
+        </pc:sldMkLst>
+        <pc:spChg chg="del">
+          <ac:chgData name="Phuong Dinh" userId="ff377d00173367d7" providerId="LiveId" clId="{CE53E717-A095-4B65-8F28-263D8246A9B1}" dt="2023-05-08T03:32:08.899" v="359" actId="22"/>
+          <ac:spMkLst>
+            <pc:docMk/>
+            <pc:sldMk cId="2329813189" sldId="269"/>
+            <ac:spMk id="3" creationId="{7B083796-9098-1F1A-A3B7-5DC1D39AE123}"/>
+          </ac:spMkLst>
+        </pc:spChg>
+        <pc:picChg chg="add mod ord">
+          <ac:chgData name="Phuong Dinh" userId="ff377d00173367d7" providerId="LiveId" clId="{CE53E717-A095-4B65-8F28-263D8246A9B1}" dt="2023-05-08T03:34:10.197" v="415" actId="1076"/>
+          <ac:picMkLst>
+            <pc:docMk/>
+            <pc:sldMk cId="2329813189" sldId="269"/>
+            <ac:picMk id="5" creationId="{B47C682F-541C-BED6-456A-5192418DDEE5}"/>
+          </ac:picMkLst>
+        </pc:picChg>
+        <pc:picChg chg="add del mod">
+          <ac:chgData name="Phuong Dinh" userId="ff377d00173367d7" providerId="LiveId" clId="{CE53E717-A095-4B65-8F28-263D8246A9B1}" dt="2023-05-08T03:33:40.319" v="401" actId="478"/>
+          <ac:picMkLst>
+            <pc:docMk/>
+            <pc:sldMk cId="2329813189" sldId="269"/>
+            <ac:picMk id="7" creationId="{7C222725-3720-106E-C4F7-0D7690776AF7}"/>
+          </ac:picMkLst>
+        </pc:picChg>
+        <pc:picChg chg="add mod">
+          <ac:chgData name="Phuong Dinh" userId="ff377d00173367d7" providerId="LiveId" clId="{CE53E717-A095-4B65-8F28-263D8246A9B1}" dt="2023-05-08T03:34:59.037" v="428" actId="1076"/>
+          <ac:picMkLst>
+            <pc:docMk/>
+            <pc:sldMk cId="2329813189" sldId="269"/>
+            <ac:picMk id="9" creationId="{863512B2-E23C-B2A3-BF59-0C378FF5A40A}"/>
+          </ac:picMkLst>
+        </pc:picChg>
+      </pc:sldChg>
+      <pc:sldChg chg="modSp mod">
+        <pc:chgData name="Phuong Dinh" userId="ff377d00173367d7" providerId="LiveId" clId="{CE53E717-A095-4B65-8F28-263D8246A9B1}" dt="2023-05-08T04:49:24.070" v="1706" actId="14100"/>
+        <pc:sldMkLst>
+          <pc:docMk/>
+          <pc:sldMk cId="2736472203" sldId="270"/>
+        </pc:sldMkLst>
+        <pc:spChg chg="mod">
+          <ac:chgData name="Phuong Dinh" userId="ff377d00173367d7" providerId="LiveId" clId="{CE53E717-A095-4B65-8F28-263D8246A9B1}" dt="2023-05-08T04:49:24.070" v="1706" actId="14100"/>
+          <ac:spMkLst>
+            <pc:docMk/>
+            <pc:sldMk cId="2736472203" sldId="270"/>
+            <ac:spMk id="3" creationId="{EF62E865-528F-BB74-A461-B532F8D04418}"/>
+          </ac:spMkLst>
+        </pc:spChg>
+      </pc:sldChg>
+      <pc:sldChg chg="addSp delSp modSp add mod ord">
+        <pc:chgData name="Phuong Dinh" userId="ff377d00173367d7" providerId="LiveId" clId="{CE53E717-A095-4B65-8F28-263D8246A9B1}" dt="2023-05-08T03:29:10.095" v="358" actId="20577"/>
+        <pc:sldMkLst>
+          <pc:docMk/>
+          <pc:sldMk cId="370609322" sldId="271"/>
+        </pc:sldMkLst>
+        <pc:spChg chg="mod">
+          <ac:chgData name="Phuong Dinh" userId="ff377d00173367d7" providerId="LiveId" clId="{CE53E717-A095-4B65-8F28-263D8246A9B1}" dt="2023-05-08T03:25:42.818" v="24" actId="20577"/>
+          <ac:spMkLst>
+            <pc:docMk/>
+            <pc:sldMk cId="370609322" sldId="271"/>
+            <ac:spMk id="2" creationId="{85045044-B935-E887-5E26-64918049B2EB}"/>
+          </ac:spMkLst>
+        </pc:spChg>
+        <pc:spChg chg="add del mod">
+          <ac:chgData name="Phuong Dinh" userId="ff377d00173367d7" providerId="LiveId" clId="{CE53E717-A095-4B65-8F28-263D8246A9B1}" dt="2023-05-08T03:26:21.884" v="26" actId="22"/>
+          <ac:spMkLst>
+            <pc:docMk/>
+            <pc:sldMk cId="370609322" sldId="271"/>
+            <ac:spMk id="4" creationId="{273BB11C-473D-81B8-F5B0-2A1A3948A17D}"/>
+          </ac:spMkLst>
+        </pc:spChg>
+        <pc:spChg chg="add mod">
+          <ac:chgData name="Phuong Dinh" userId="ff377d00173367d7" providerId="LiveId" clId="{CE53E717-A095-4B65-8F28-263D8246A9B1}" dt="2023-05-08T03:29:10.095" v="358" actId="20577"/>
+          <ac:spMkLst>
+            <pc:docMk/>
+            <pc:sldMk cId="370609322" sldId="271"/>
+            <ac:spMk id="8" creationId="{A49CA63F-DE0E-60E1-5BF8-AE22E769DA0E}"/>
+          </ac:spMkLst>
+        </pc:spChg>
+        <pc:picChg chg="del">
+          <ac:chgData name="Phuong Dinh" userId="ff377d00173367d7" providerId="LiveId" clId="{CE53E717-A095-4B65-8F28-263D8246A9B1}" dt="2023-05-08T03:25:45.245" v="25" actId="478"/>
+          <ac:picMkLst>
+            <pc:docMk/>
+            <pc:sldMk cId="370609322" sldId="271"/>
+            <ac:picMk id="5" creationId="{9EE18AD8-CA0D-E0E2-F524-E5EED44737CE}"/>
+          </ac:picMkLst>
+        </pc:picChg>
+        <pc:picChg chg="add mod ord">
+          <ac:chgData name="Phuong Dinh" userId="ff377d00173367d7" providerId="LiveId" clId="{CE53E717-A095-4B65-8F28-263D8246A9B1}" dt="2023-05-08T03:28:16.967" v="253" actId="1076"/>
+          <ac:picMkLst>
+            <pc:docMk/>
+            <pc:sldMk cId="370609322" sldId="271"/>
+            <ac:picMk id="7" creationId="{6D426DA3-58B4-8FB7-B398-F3700441F898}"/>
+          </ac:picMkLst>
+        </pc:picChg>
+      </pc:sldChg>
+      <pc:sldChg chg="new del">
+        <pc:chgData name="Phuong Dinh" userId="ff377d00173367d7" providerId="LiveId" clId="{CE53E717-A095-4B65-8F28-263D8246A9B1}" dt="2023-05-08T03:25:27.861" v="1" actId="47"/>
+        <pc:sldMkLst>
+          <pc:docMk/>
+          <pc:sldMk cId="2527560251" sldId="271"/>
+        </pc:sldMkLst>
+      </pc:sldChg>
+      <pc:sldChg chg="addSp delSp modSp add mod">
+        <pc:chgData name="Phuong Dinh" userId="ff377d00173367d7" providerId="LiveId" clId="{CE53E717-A095-4B65-8F28-263D8246A9B1}" dt="2023-05-08T04:47:34.400" v="1691" actId="1076"/>
+        <pc:sldMkLst>
+          <pc:docMk/>
+          <pc:sldMk cId="2161592378" sldId="272"/>
+        </pc:sldMkLst>
+        <pc:spChg chg="mod">
+          <ac:chgData name="Phuong Dinh" userId="ff377d00173367d7" providerId="LiveId" clId="{CE53E717-A095-4B65-8F28-263D8246A9B1}" dt="2023-05-08T03:33:23.930" v="398" actId="20577"/>
+          <ac:spMkLst>
+            <pc:docMk/>
+            <pc:sldMk cId="2161592378" sldId="272"/>
+            <ac:spMk id="2" creationId="{12D832DF-30DA-AD69-39E9-4B2A1C0387E8}"/>
+          </ac:spMkLst>
+        </pc:spChg>
+        <pc:spChg chg="add del mod">
+          <ac:chgData name="Phuong Dinh" userId="ff377d00173367d7" providerId="LiveId" clId="{CE53E717-A095-4B65-8F28-263D8246A9B1}" dt="2023-05-08T03:33:31.057" v="400" actId="478"/>
+          <ac:spMkLst>
+            <pc:docMk/>
+            <pc:sldMk cId="2161592378" sldId="272"/>
+            <ac:spMk id="4" creationId="{A202B3F9-BE9E-5BCD-B879-B01DB7A8423D}"/>
+          </ac:spMkLst>
+        </pc:spChg>
+        <pc:picChg chg="del">
+          <ac:chgData name="Phuong Dinh" userId="ff377d00173367d7" providerId="LiveId" clId="{CE53E717-A095-4B65-8F28-263D8246A9B1}" dt="2023-05-08T03:33:27.250" v="399" actId="478"/>
+          <ac:picMkLst>
+            <pc:docMk/>
+            <pc:sldMk cId="2161592378" sldId="272"/>
+            <ac:picMk id="5" creationId="{B47C682F-541C-BED6-456A-5192418DDEE5}"/>
+          </ac:picMkLst>
+        </pc:picChg>
+        <pc:picChg chg="del">
+          <ac:chgData name="Phuong Dinh" userId="ff377d00173367d7" providerId="LiveId" clId="{CE53E717-A095-4B65-8F28-263D8246A9B1}" dt="2023-05-08T03:34:14.918" v="416" actId="478"/>
+          <ac:picMkLst>
+            <pc:docMk/>
+            <pc:sldMk cId="2161592378" sldId="272"/>
+            <ac:picMk id="7" creationId="{7C222725-3720-106E-C4F7-0D7690776AF7}"/>
+          </ac:picMkLst>
+        </pc:picChg>
+        <pc:picChg chg="add mod">
+          <ac:chgData name="Phuong Dinh" userId="ff377d00173367d7" providerId="LiveId" clId="{CE53E717-A095-4B65-8F28-263D8246A9B1}" dt="2023-05-08T04:47:34.400" v="1691" actId="1076"/>
+          <ac:picMkLst>
+            <pc:docMk/>
+            <pc:sldMk cId="2161592378" sldId="272"/>
+            <ac:picMk id="8" creationId="{E2C2483F-67EE-AAC9-7CC9-E952B26C8DA1}"/>
+          </ac:picMkLst>
+        </pc:picChg>
+      </pc:sldChg>
+      <pc:sldChg chg="addSp delSp modSp add mod">
+        <pc:chgData name="Phuong Dinh" userId="ff377d00173367d7" providerId="LiveId" clId="{CE53E717-A095-4B65-8F28-263D8246A9B1}" dt="2023-05-08T05:57:11.128" v="1735" actId="1076"/>
+        <pc:sldMkLst>
+          <pc:docMk/>
+          <pc:sldMk cId="2429300832" sldId="273"/>
+        </pc:sldMkLst>
+        <pc:spChg chg="mod">
+          <ac:chgData name="Phuong Dinh" userId="ff377d00173367d7" providerId="LiveId" clId="{CE53E717-A095-4B65-8F28-263D8246A9B1}" dt="2023-05-08T05:37:43.382" v="1712" actId="20577"/>
+          <ac:spMkLst>
+            <pc:docMk/>
+            <pc:sldMk cId="2429300832" sldId="273"/>
+            <ac:spMk id="2" creationId="{12D832DF-30DA-AD69-39E9-4B2A1C0387E8}"/>
+          </ac:spMkLst>
+        </pc:spChg>
+        <pc:picChg chg="add mod">
+          <ac:chgData name="Phuong Dinh" userId="ff377d00173367d7" providerId="LiveId" clId="{CE53E717-A095-4B65-8F28-263D8246A9B1}" dt="2023-05-08T05:57:11.128" v="1735" actId="1076"/>
+          <ac:picMkLst>
+            <pc:docMk/>
+            <pc:sldMk cId="2429300832" sldId="273"/>
+            <ac:picMk id="4" creationId="{2514449F-6117-A5D4-251E-47BDE48E7C5B}"/>
+          </ac:picMkLst>
+        </pc:picChg>
+        <pc:picChg chg="del">
+          <ac:chgData name="Phuong Dinh" userId="ff377d00173367d7" providerId="LiveId" clId="{CE53E717-A095-4B65-8F28-263D8246A9B1}" dt="2023-05-08T05:37:45.101" v="1713" actId="478"/>
+          <ac:picMkLst>
+            <pc:docMk/>
+            <pc:sldMk cId="2429300832" sldId="273"/>
+            <ac:picMk id="8" creationId="{E2C2483F-67EE-AAC9-7CC9-E952B26C8DA1}"/>
+          </ac:picMkLst>
+        </pc:picChg>
+      </pc:sldChg>
+      <pc:sldChg chg="addSp delSp modSp add mod">
+        <pc:chgData name="Phuong Dinh" userId="ff377d00173367d7" providerId="LiveId" clId="{CE53E717-A095-4B65-8F28-263D8246A9B1}" dt="2023-05-08T05:56:49.656" v="1731" actId="962"/>
+        <pc:sldMkLst>
+          <pc:docMk/>
+          <pc:sldMk cId="494687895" sldId="274"/>
+        </pc:sldMkLst>
+        <pc:spChg chg="del mod">
+          <ac:chgData name="Phuong Dinh" userId="ff377d00173367d7" providerId="LiveId" clId="{CE53E717-A095-4B65-8F28-263D8246A9B1}" dt="2023-05-08T05:56:11.263" v="1727" actId="478"/>
+          <ac:spMkLst>
+            <pc:docMk/>
+            <pc:sldMk cId="494687895" sldId="274"/>
+            <ac:spMk id="2" creationId="{12D832DF-30DA-AD69-39E9-4B2A1C0387E8}"/>
+          </ac:spMkLst>
+        </pc:spChg>
+        <pc:spChg chg="add del mod">
+          <ac:chgData name="Phuong Dinh" userId="ff377d00173367d7" providerId="LiveId" clId="{CE53E717-A095-4B65-8F28-263D8246A9B1}" dt="2023-05-08T05:56:13.196" v="1728" actId="478"/>
+          <ac:spMkLst>
+            <pc:docMk/>
+            <pc:sldMk cId="494687895" sldId="274"/>
+            <ac:spMk id="5" creationId="{710FD2A9-9D14-DA87-4D9A-BD0A291402EB}"/>
+          </ac:spMkLst>
+        </pc:spChg>
+        <pc:picChg chg="del">
+          <ac:chgData name="Phuong Dinh" userId="ff377d00173367d7" providerId="LiveId" clId="{CE53E717-A095-4B65-8F28-263D8246A9B1}" dt="2023-05-08T05:56:03.081" v="1725" actId="478"/>
+          <ac:picMkLst>
+            <pc:docMk/>
+            <pc:sldMk cId="494687895" sldId="274"/>
+            <ac:picMk id="4" creationId="{2514449F-6117-A5D4-251E-47BDE48E7C5B}"/>
+          </ac:picMkLst>
+        </pc:picChg>
+        <pc:picChg chg="add mod">
+          <ac:chgData name="Phuong Dinh" userId="ff377d00173367d7" providerId="LiveId" clId="{CE53E717-A095-4B65-8F28-263D8246A9B1}" dt="2023-05-08T05:56:49.656" v="1731" actId="962"/>
+          <ac:picMkLst>
+            <pc:docMk/>
+            <pc:sldMk cId="494687895" sldId="274"/>
+            <ac:picMk id="7" creationId="{15323F57-2A37-E932-EDD4-46E0D1D05940}"/>
+          </ac:picMkLst>
+        </pc:picChg>
+      </pc:sldChg>
+    </pc:docChg>
+  </pc:docChgLst>
+</pc:chgInfo>
 </file>
 
 <file path=ppt/slideLayouts/slideLayout1.xml><?xml version="1.0" encoding="utf-8"?>
@@ -622,7 +878,7 @@
           <a:p>
             <a:fld id="{5DBDDF98-C922-483F-97E9-3E76B0201B42}" type="datetimeFigureOut">
               <a:rPr lang="en-US" smtClean="0"/>
-              <a:t>5/7/23</a:t>
+              <a:t>5/7/2023</a:t>
             </a:fld>
             <a:endParaRPr lang="en-US"/>
           </a:p>
@@ -800,7 +1056,7 @@
             <a:fld id="{5DBDDF98-C922-483F-97E9-3E76B0201B42}" type="datetimeFigureOut">
               <a:rPr lang="en-US" smtClean="0"/>
               <a:pPr/>
-              <a:t>5/7/23</a:t>
+              <a:t>5/7/2023</a:t>
             </a:fld>
             <a:endParaRPr lang="en-US"/>
           </a:p>
@@ -982,7 +1238,7 @@
             <a:fld id="{5DBDDF98-C922-483F-97E9-3E76B0201B42}" type="datetimeFigureOut">
               <a:rPr lang="en-US" smtClean="0"/>
               <a:pPr/>
-              <a:t>5/7/23</a:t>
+              <a:t>5/7/2023</a:t>
             </a:fld>
             <a:endParaRPr lang="en-US"/>
           </a:p>
@@ -1154,7 +1410,7 @@
             <a:fld id="{5DBDDF98-C922-483F-97E9-3E76B0201B42}" type="datetimeFigureOut">
               <a:rPr lang="en-US" smtClean="0"/>
               <a:pPr/>
-              <a:t>5/7/23</a:t>
+              <a:t>5/7/2023</a:t>
             </a:fld>
             <a:endParaRPr lang="en-US"/>
           </a:p>
@@ -1476,7 +1732,7 @@
           <a:p>
             <a:fld id="{5DBDDF98-C922-483F-97E9-3E76B0201B42}" type="datetimeFigureOut">
               <a:rPr lang="en-US" smtClean="0"/>
-              <a:t>5/7/23</a:t>
+              <a:t>5/7/2023</a:t>
             </a:fld>
             <a:endParaRPr lang="en-US"/>
           </a:p>
@@ -1937,7 +2193,7 @@
             <a:fld id="{5DBDDF98-C922-483F-97E9-3E76B0201B42}" type="datetimeFigureOut">
               <a:rPr lang="en-US" smtClean="0"/>
               <a:pPr/>
-              <a:t>5/7/23</a:t>
+              <a:t>5/7/2023</a:t>
             </a:fld>
             <a:endParaRPr lang="en-US"/>
           </a:p>
@@ -2350,7 +2606,7 @@
             <a:fld id="{5DBDDF98-C922-483F-97E9-3E76B0201B42}" type="datetimeFigureOut">
               <a:rPr lang="en-US" smtClean="0"/>
               <a:pPr/>
-              <a:t>5/7/23</a:t>
+              <a:t>5/7/2023</a:t>
             </a:fld>
             <a:endParaRPr lang="en-US"/>
           </a:p>
@@ -2469,7 +2725,7 @@
           <a:p>
             <a:fld id="{5DBDDF98-C922-483F-97E9-3E76B0201B42}" type="datetimeFigureOut">
               <a:rPr lang="en-US" smtClean="0"/>
-              <a:t>5/7/23</a:t>
+              <a:t>5/7/2023</a:t>
             </a:fld>
             <a:endParaRPr lang="en-US"/>
           </a:p>
@@ -2586,7 +2842,7 @@
           <a:p>
             <a:fld id="{5DBDDF98-C922-483F-97E9-3E76B0201B42}" type="datetimeFigureOut">
               <a:rPr lang="en-US" smtClean="0"/>
-              <a:t>5/7/23</a:t>
+              <a:t>5/7/2023</a:t>
             </a:fld>
             <a:endParaRPr lang="en-US"/>
           </a:p>
@@ -2945,7 +3201,7 @@
             <a:fld id="{5DBDDF98-C922-483F-97E9-3E76B0201B42}" type="datetimeFigureOut">
               <a:rPr lang="en-US" smtClean="0"/>
               <a:pPr/>
-              <a:t>5/7/23</a:t>
+              <a:t>5/7/2023</a:t>
             </a:fld>
             <a:endParaRPr lang="en-US"/>
           </a:p>
@@ -3453,7 +3709,7 @@
           <a:p>
             <a:fld id="{5DBDDF98-C922-483F-97E9-3E76B0201B42}" type="datetimeFigureOut">
               <a:rPr lang="en-US" smtClean="0"/>
-              <a:t>5/7/23</a:t>
+              <a:t>5/7/2023</a:t>
             </a:fld>
             <a:endParaRPr lang="en-US"/>
           </a:p>
@@ -3809,7 +4065,7 @@
             <a:fld id="{5DBDDF98-C922-483F-97E9-3E76B0201B42}" type="datetimeFigureOut">
               <a:rPr lang="en-US" smtClean="0"/>
               <a:pPr/>
-              <a:t>5/7/23</a:t>
+              <a:t>5/7/2023</a:t>
             </a:fld>
             <a:endParaRPr lang="en-US"/>
           </a:p>
@@ -5342,6 +5598,93 @@
           <p:cNvPr id="2" name="Title 1">
             <a:extLst>
               <a:ext uri="{FF2B5EF4-FFF2-40B4-BE49-F238E27FC236}">
+                <a16:creationId xmlns:a16="http://schemas.microsoft.com/office/drawing/2014/main" id="{3278CA32-D526-A982-E1FB-E4618AB9AED5}"/>
+              </a:ext>
+            </a:extLst>
+          </p:cNvPr>
+          <p:cNvSpPr>
+            <a:spLocks noGrp="1"/>
+          </p:cNvSpPr>
+          <p:nvPr>
+            <p:ph type="title"/>
+          </p:nvPr>
+        </p:nvSpPr>
+        <p:spPr/>
+        <p:txBody>
+          <a:bodyPr/>
+          <a:lstStyle/>
+          <a:p>
+            <a:r>
+              <a:rPr lang="en-US" dirty="0" err="1"/>
+              <a:t>iDENTIFYING</a:t>
+            </a:r>
+            <a:r>
+              <a:rPr lang="en-US" dirty="0"/>
+              <a:t> OUTLIERS</a:t>
+            </a:r>
+          </a:p>
+        </p:txBody>
+      </p:sp>
+      <p:sp>
+        <p:nvSpPr>
+          <p:cNvPr id="3" name="Content Placeholder 2">
+            <a:extLst>
+              <a:ext uri="{FF2B5EF4-FFF2-40B4-BE49-F238E27FC236}">
+                <a16:creationId xmlns:a16="http://schemas.microsoft.com/office/drawing/2014/main" id="{17240ACD-067A-F848-3734-873FB48D0E8C}"/>
+              </a:ext>
+            </a:extLst>
+          </p:cNvPr>
+          <p:cNvSpPr>
+            <a:spLocks noGrp="1"/>
+          </p:cNvSpPr>
+          <p:nvPr>
+            <p:ph idx="1"/>
+          </p:nvPr>
+        </p:nvSpPr>
+        <p:spPr/>
+        <p:txBody>
+          <a:bodyPr/>
+          <a:lstStyle/>
+          <a:p>
+            <a:endParaRPr lang="en-US"/>
+          </a:p>
+        </p:txBody>
+      </p:sp>
+    </p:spTree>
+    <p:extLst>
+      <p:ext uri="{BB962C8B-B14F-4D97-AF65-F5344CB8AC3E}">
+        <p14:creationId xmlns:p14="http://schemas.microsoft.com/office/powerpoint/2010/main" val="2167812012"/>
+      </p:ext>
+    </p:extLst>
+  </p:cSld>
+  <p:clrMapOvr>
+    <a:masterClrMapping/>
+  </p:clrMapOvr>
+</p:sld>
+</file>
+
+<file path=ppt/slides/slide11.xml><?xml version="1.0" encoding="utf-8"?>
+<p:sld xmlns:a="http://schemas.openxmlformats.org/drawingml/2006/main" xmlns:r="http://schemas.openxmlformats.org/officeDocument/2006/relationships" xmlns:p="http://schemas.openxmlformats.org/presentationml/2006/main">
+  <p:cSld>
+    <p:spTree>
+      <p:nvGrpSpPr>
+        <p:cNvPr id="1" name=""/>
+        <p:cNvGrpSpPr/>
+        <p:nvPr/>
+      </p:nvGrpSpPr>
+      <p:grpSpPr>
+        <a:xfrm>
+          <a:off x="0" y="0"/>
+          <a:ext cx="0" cy="0"/>
+          <a:chOff x="0" y="0"/>
+          <a:chExt cx="0" cy="0"/>
+        </a:xfrm>
+      </p:grpSpPr>
+      <p:sp>
+        <p:nvSpPr>
+          <p:cNvPr id="2" name="Title 1">
+            <a:extLst>
+              <a:ext uri="{FF2B5EF4-FFF2-40B4-BE49-F238E27FC236}">
                 <a16:creationId xmlns:a16="http://schemas.microsoft.com/office/drawing/2014/main" id="{AA734107-3854-E214-9312-9B25B406436C}"/>
               </a:ext>
             </a:extLst>
@@ -5407,7 +5750,7 @@
 </p:sld>
 </file>
 
-<file path=ppt/slides/slide11.xml><?xml version="1.0" encoding="utf-8"?>
+<file path=ppt/slides/slide12.xml><?xml version="1.0" encoding="utf-8"?>
 <p:sld xmlns:a="http://schemas.openxmlformats.org/drawingml/2006/main" xmlns:r="http://schemas.openxmlformats.org/officeDocument/2006/relationships" xmlns:p="http://schemas.openxmlformats.org/presentationml/2006/main">
   <p:cSld>
     <p:spTree>
@@ -5494,7 +5837,7 @@
 </p:sld>
 </file>
 
-<file path=ppt/slides/slide12.xml><?xml version="1.0" encoding="utf-8"?>
+<file path=ppt/slides/slide13.xml><?xml version="1.0" encoding="utf-8"?>
 <p:sld xmlns:a="http://schemas.openxmlformats.org/drawingml/2006/main" xmlns:r="http://schemas.openxmlformats.org/officeDocument/2006/relationships" xmlns:p="http://schemas.openxmlformats.org/presentationml/2006/main">
   <p:cSld>
     <p:spTree>
@@ -5554,89 +5897,6 @@
 </p:sld>
 </file>
 
-<file path=ppt/slides/slide13.xml><?xml version="1.0" encoding="utf-8"?>
-<p:sld xmlns:a="http://schemas.openxmlformats.org/drawingml/2006/main" xmlns:r="http://schemas.openxmlformats.org/officeDocument/2006/relationships" xmlns:p="http://schemas.openxmlformats.org/presentationml/2006/main">
-  <p:cSld>
-    <p:spTree>
-      <p:nvGrpSpPr>
-        <p:cNvPr id="1" name=""/>
-        <p:cNvGrpSpPr/>
-        <p:nvPr/>
-      </p:nvGrpSpPr>
-      <p:grpSpPr>
-        <a:xfrm>
-          <a:off x="0" y="0"/>
-          <a:ext cx="0" cy="0"/>
-          <a:chOff x="0" y="0"/>
-          <a:chExt cx="0" cy="0"/>
-        </a:xfrm>
-      </p:grpSpPr>
-      <p:sp>
-        <p:nvSpPr>
-          <p:cNvPr id="2" name="Title 1">
-            <a:extLst>
-              <a:ext uri="{FF2B5EF4-FFF2-40B4-BE49-F238E27FC236}">
-                <a16:creationId xmlns:a16="http://schemas.microsoft.com/office/drawing/2014/main" id="{7E83059B-5639-9571-EDC3-18AAB07C0513}"/>
-              </a:ext>
-            </a:extLst>
-          </p:cNvPr>
-          <p:cNvSpPr>
-            <a:spLocks noGrp="1"/>
-          </p:cNvSpPr>
-          <p:nvPr>
-            <p:ph type="title"/>
-          </p:nvPr>
-        </p:nvSpPr>
-        <p:spPr/>
-        <p:txBody>
-          <a:bodyPr/>
-          <a:lstStyle/>
-          <a:p>
-            <a:r>
-              <a:rPr lang="en-US" dirty="0"/>
-              <a:t>Random forest</a:t>
-            </a:r>
-          </a:p>
-        </p:txBody>
-      </p:sp>
-      <p:sp>
-        <p:nvSpPr>
-          <p:cNvPr id="3" name="Content Placeholder 2">
-            <a:extLst>
-              <a:ext uri="{FF2B5EF4-FFF2-40B4-BE49-F238E27FC236}">
-                <a16:creationId xmlns:a16="http://schemas.microsoft.com/office/drawing/2014/main" id="{37A867BE-FBCF-81EF-0963-2BFDBB74A0C3}"/>
-              </a:ext>
-            </a:extLst>
-          </p:cNvPr>
-          <p:cNvSpPr>
-            <a:spLocks noGrp="1"/>
-          </p:cNvSpPr>
-          <p:nvPr>
-            <p:ph idx="1"/>
-          </p:nvPr>
-        </p:nvSpPr>
-        <p:spPr/>
-        <p:txBody>
-          <a:bodyPr/>
-          <a:lstStyle/>
-          <a:p>
-            <a:endParaRPr lang="en-US"/>
-          </a:p>
-        </p:txBody>
-      </p:sp>
-    </p:spTree>
-    <p:extLst>
-      <p:ext uri="{BB962C8B-B14F-4D97-AF65-F5344CB8AC3E}">
-        <p14:creationId xmlns:p14="http://schemas.microsoft.com/office/powerpoint/2010/main" val="1242738002"/>
-      </p:ext>
-    </p:extLst>
-  </p:cSld>
-  <p:clrMapOvr>
-    <a:masterClrMapping/>
-  </p:clrMapOvr>
-</p:sld>
-</file>
-
 <file path=ppt/slides/slide14.xml><?xml version="1.0" encoding="utf-8"?>
 <p:sld xmlns:a="http://schemas.openxmlformats.org/drawingml/2006/main" xmlns:r="http://schemas.openxmlformats.org/officeDocument/2006/relationships" xmlns:p="http://schemas.openxmlformats.org/presentationml/2006/main">
   <p:cSld>
@@ -5659,7 +5919,7 @@
           <p:cNvPr id="2" name="Title 1">
             <a:extLst>
               <a:ext uri="{FF2B5EF4-FFF2-40B4-BE49-F238E27FC236}">
-                <a16:creationId xmlns:a16="http://schemas.microsoft.com/office/drawing/2014/main" id="{12D832DF-30DA-AD69-39E9-4B2A1C0387E8}"/>
+                <a16:creationId xmlns:a16="http://schemas.microsoft.com/office/drawing/2014/main" id="{7E83059B-5639-9571-EDC3-18AAB07C0513}"/>
               </a:ext>
             </a:extLst>
           </p:cNvPr>
@@ -5677,7 +5937,7 @@
           <a:p>
             <a:r>
               <a:rPr lang="en-US" dirty="0"/>
-              <a:t>Neural network</a:t>
+              <a:t>Random forest</a:t>
             </a:r>
           </a:p>
         </p:txBody>
@@ -5687,7 +5947,7 @@
           <p:cNvPr id="3" name="Content Placeholder 2">
             <a:extLst>
               <a:ext uri="{FF2B5EF4-FFF2-40B4-BE49-F238E27FC236}">
-                <a16:creationId xmlns:a16="http://schemas.microsoft.com/office/drawing/2014/main" id="{7B083796-9098-1F1A-A3B7-5DC1D39AE123}"/>
+                <a16:creationId xmlns:a16="http://schemas.microsoft.com/office/drawing/2014/main" id="{37A867BE-FBCF-81EF-0963-2BFDBB74A0C3}"/>
               </a:ext>
             </a:extLst>
           </p:cNvPr>
@@ -5710,7 +5970,7 @@
     </p:spTree>
     <p:extLst>
       <p:ext uri="{BB962C8B-B14F-4D97-AF65-F5344CB8AC3E}">
-        <p14:creationId xmlns:p14="http://schemas.microsoft.com/office/powerpoint/2010/main" val="2329813189"/>
+        <p14:creationId xmlns:p14="http://schemas.microsoft.com/office/powerpoint/2010/main" val="1242738002"/>
       </p:ext>
     </p:extLst>
   </p:cSld>
@@ -5742,6 +6002,359 @@
           <p:cNvPr id="2" name="Title 1">
             <a:extLst>
               <a:ext uri="{FF2B5EF4-FFF2-40B4-BE49-F238E27FC236}">
+                <a16:creationId xmlns:a16="http://schemas.microsoft.com/office/drawing/2014/main" id="{12D832DF-30DA-AD69-39E9-4B2A1C0387E8}"/>
+              </a:ext>
+            </a:extLst>
+          </p:cNvPr>
+          <p:cNvSpPr>
+            <a:spLocks noGrp="1"/>
+          </p:cNvSpPr>
+          <p:nvPr>
+            <p:ph type="title"/>
+          </p:nvPr>
+        </p:nvSpPr>
+        <p:spPr/>
+        <p:txBody>
+          <a:bodyPr/>
+          <a:lstStyle/>
+          <a:p>
+            <a:r>
+              <a:rPr lang="en-US" dirty="0"/>
+              <a:t>Neural network</a:t>
+            </a:r>
+          </a:p>
+        </p:txBody>
+      </p:sp>
+      <p:pic>
+        <p:nvPicPr>
+          <p:cNvPr id="5" name="Content Placeholder 4">
+            <a:extLst>
+              <a:ext uri="{FF2B5EF4-FFF2-40B4-BE49-F238E27FC236}">
+                <a16:creationId xmlns:a16="http://schemas.microsoft.com/office/drawing/2014/main" id="{B47C682F-541C-BED6-456A-5192418DDEE5}"/>
+              </a:ext>
+            </a:extLst>
+          </p:cNvPr>
+          <p:cNvPicPr>
+            <a:picLocks noGrp="1" noChangeAspect="1"/>
+          </p:cNvPicPr>
+          <p:nvPr>
+            <p:ph idx="1"/>
+          </p:nvPr>
+        </p:nvPicPr>
+        <p:blipFill>
+          <a:blip r:embed="rId2"/>
+          <a:stretch>
+            <a:fillRect/>
+          </a:stretch>
+        </p:blipFill>
+        <p:spPr>
+          <a:xfrm>
+            <a:off x="1063752" y="2178494"/>
+            <a:ext cx="9841992" cy="1344688"/>
+          </a:xfrm>
+        </p:spPr>
+      </p:pic>
+      <p:pic>
+        <p:nvPicPr>
+          <p:cNvPr id="9" name="Picture 8">
+            <a:extLst>
+              <a:ext uri="{FF2B5EF4-FFF2-40B4-BE49-F238E27FC236}">
+                <a16:creationId xmlns:a16="http://schemas.microsoft.com/office/drawing/2014/main" id="{863512B2-E23C-B2A3-BF59-0C378FF5A40A}"/>
+              </a:ext>
+            </a:extLst>
+          </p:cNvPr>
+          <p:cNvPicPr>
+            <a:picLocks noChangeAspect="1"/>
+          </p:cNvPicPr>
+          <p:nvPr/>
+        </p:nvPicPr>
+        <p:blipFill>
+          <a:blip r:embed="rId3"/>
+          <a:stretch>
+            <a:fillRect/>
+          </a:stretch>
+        </p:blipFill>
+        <p:spPr>
+          <a:xfrm>
+            <a:off x="1063752" y="3906404"/>
+            <a:ext cx="9841992" cy="903339"/>
+          </a:xfrm>
+          <a:prstGeom prst="rect">
+            <a:avLst/>
+          </a:prstGeom>
+        </p:spPr>
+      </p:pic>
+    </p:spTree>
+    <p:extLst>
+      <p:ext uri="{BB962C8B-B14F-4D97-AF65-F5344CB8AC3E}">
+        <p14:creationId xmlns:p14="http://schemas.microsoft.com/office/powerpoint/2010/main" val="2329813189"/>
+      </p:ext>
+    </p:extLst>
+  </p:cSld>
+  <p:clrMapOvr>
+    <a:masterClrMapping/>
+  </p:clrMapOvr>
+</p:sld>
+</file>
+
+<file path=ppt/slides/slide16.xml><?xml version="1.0" encoding="utf-8"?>
+<p:sld xmlns:a="http://schemas.openxmlformats.org/drawingml/2006/main" xmlns:r="http://schemas.openxmlformats.org/officeDocument/2006/relationships" xmlns:p="http://schemas.openxmlformats.org/presentationml/2006/main">
+  <p:cSld>
+    <p:spTree>
+      <p:nvGrpSpPr>
+        <p:cNvPr id="1" name=""/>
+        <p:cNvGrpSpPr/>
+        <p:nvPr/>
+      </p:nvGrpSpPr>
+      <p:grpSpPr>
+        <a:xfrm>
+          <a:off x="0" y="0"/>
+          <a:ext cx="0" cy="0"/>
+          <a:chOff x="0" y="0"/>
+          <a:chExt cx="0" cy="0"/>
+        </a:xfrm>
+      </p:grpSpPr>
+      <p:sp>
+        <p:nvSpPr>
+          <p:cNvPr id="2" name="Title 1">
+            <a:extLst>
+              <a:ext uri="{FF2B5EF4-FFF2-40B4-BE49-F238E27FC236}">
+                <a16:creationId xmlns:a16="http://schemas.microsoft.com/office/drawing/2014/main" id="{12D832DF-30DA-AD69-39E9-4B2A1C0387E8}"/>
+              </a:ext>
+            </a:extLst>
+          </p:cNvPr>
+          <p:cNvSpPr>
+            <a:spLocks noGrp="1"/>
+          </p:cNvSpPr>
+          <p:nvPr>
+            <p:ph type="title"/>
+          </p:nvPr>
+        </p:nvSpPr>
+        <p:spPr/>
+        <p:txBody>
+          <a:bodyPr/>
+          <a:lstStyle/>
+          <a:p>
+            <a:r>
+              <a:rPr lang="en-US" dirty="0"/>
+              <a:t>Neural network Initial Result</a:t>
+            </a:r>
+          </a:p>
+        </p:txBody>
+      </p:sp>
+      <p:pic>
+        <p:nvPicPr>
+          <p:cNvPr id="8" name="Picture 7">
+            <a:extLst>
+              <a:ext uri="{FF2B5EF4-FFF2-40B4-BE49-F238E27FC236}">
+                <a16:creationId xmlns:a16="http://schemas.microsoft.com/office/drawing/2014/main" id="{E2C2483F-67EE-AAC9-7CC9-E952B26C8DA1}"/>
+              </a:ext>
+            </a:extLst>
+          </p:cNvPr>
+          <p:cNvPicPr>
+            <a:picLocks noChangeAspect="1"/>
+          </p:cNvPicPr>
+          <p:nvPr/>
+        </p:nvPicPr>
+        <p:blipFill>
+          <a:blip r:embed="rId2"/>
+          <a:stretch>
+            <a:fillRect/>
+          </a:stretch>
+        </p:blipFill>
+        <p:spPr>
+          <a:xfrm>
+            <a:off x="1069848" y="2429185"/>
+            <a:ext cx="10058400" cy="2996255"/>
+          </a:xfrm>
+          <a:prstGeom prst="rect">
+            <a:avLst/>
+          </a:prstGeom>
+        </p:spPr>
+      </p:pic>
+    </p:spTree>
+    <p:extLst>
+      <p:ext uri="{BB962C8B-B14F-4D97-AF65-F5344CB8AC3E}">
+        <p14:creationId xmlns:p14="http://schemas.microsoft.com/office/powerpoint/2010/main" val="2161592378"/>
+      </p:ext>
+    </p:extLst>
+  </p:cSld>
+  <p:clrMapOvr>
+    <a:masterClrMapping/>
+  </p:clrMapOvr>
+</p:sld>
+</file>
+
+<file path=ppt/slides/slide17.xml><?xml version="1.0" encoding="utf-8"?>
+<p:sld xmlns:a="http://schemas.openxmlformats.org/drawingml/2006/main" xmlns:r="http://schemas.openxmlformats.org/officeDocument/2006/relationships" xmlns:p="http://schemas.openxmlformats.org/presentationml/2006/main">
+  <p:cSld>
+    <p:spTree>
+      <p:nvGrpSpPr>
+        <p:cNvPr id="1" name=""/>
+        <p:cNvGrpSpPr/>
+        <p:nvPr/>
+      </p:nvGrpSpPr>
+      <p:grpSpPr>
+        <a:xfrm>
+          <a:off x="0" y="0"/>
+          <a:ext cx="0" cy="0"/>
+          <a:chOff x="0" y="0"/>
+          <a:chExt cx="0" cy="0"/>
+        </a:xfrm>
+      </p:grpSpPr>
+      <p:sp>
+        <p:nvSpPr>
+          <p:cNvPr id="2" name="Title 1">
+            <a:extLst>
+              <a:ext uri="{FF2B5EF4-FFF2-40B4-BE49-F238E27FC236}">
+                <a16:creationId xmlns:a16="http://schemas.microsoft.com/office/drawing/2014/main" id="{12D832DF-30DA-AD69-39E9-4B2A1C0387E8}"/>
+              </a:ext>
+            </a:extLst>
+          </p:cNvPr>
+          <p:cNvSpPr>
+            <a:spLocks noGrp="1"/>
+          </p:cNvSpPr>
+          <p:nvPr>
+            <p:ph type="title"/>
+          </p:nvPr>
+        </p:nvSpPr>
+        <p:spPr/>
+        <p:txBody>
+          <a:bodyPr/>
+          <a:lstStyle/>
+          <a:p>
+            <a:r>
+              <a:rPr lang="en-US" dirty="0"/>
+              <a:t>Neural network Final Result</a:t>
+            </a:r>
+          </a:p>
+        </p:txBody>
+      </p:sp>
+      <p:pic>
+        <p:nvPicPr>
+          <p:cNvPr id="4" name="Picture 3">
+            <a:extLst>
+              <a:ext uri="{FF2B5EF4-FFF2-40B4-BE49-F238E27FC236}">
+                <a16:creationId xmlns:a16="http://schemas.microsoft.com/office/drawing/2014/main" id="{2514449F-6117-A5D4-251E-47BDE48E7C5B}"/>
+              </a:ext>
+            </a:extLst>
+          </p:cNvPr>
+          <p:cNvPicPr>
+            <a:picLocks noChangeAspect="1"/>
+          </p:cNvPicPr>
+          <p:nvPr/>
+        </p:nvPicPr>
+        <p:blipFill>
+          <a:blip r:embed="rId2"/>
+          <a:stretch>
+            <a:fillRect/>
+          </a:stretch>
+        </p:blipFill>
+        <p:spPr>
+          <a:xfrm>
+            <a:off x="1069848" y="2225040"/>
+            <a:ext cx="9817608" cy="2816352"/>
+          </a:xfrm>
+          <a:prstGeom prst="rect">
+            <a:avLst/>
+          </a:prstGeom>
+        </p:spPr>
+      </p:pic>
+    </p:spTree>
+    <p:extLst>
+      <p:ext uri="{BB962C8B-B14F-4D97-AF65-F5344CB8AC3E}">
+        <p14:creationId xmlns:p14="http://schemas.microsoft.com/office/powerpoint/2010/main" val="2429300832"/>
+      </p:ext>
+    </p:extLst>
+  </p:cSld>
+  <p:clrMapOvr>
+    <a:masterClrMapping/>
+  </p:clrMapOvr>
+</p:sld>
+</file>
+
+<file path=ppt/slides/slide18.xml><?xml version="1.0" encoding="utf-8"?>
+<p:sld xmlns:a="http://schemas.openxmlformats.org/drawingml/2006/main" xmlns:r="http://schemas.openxmlformats.org/officeDocument/2006/relationships" xmlns:p="http://schemas.openxmlformats.org/presentationml/2006/main">
+  <p:cSld>
+    <p:spTree>
+      <p:nvGrpSpPr>
+        <p:cNvPr id="1" name=""/>
+        <p:cNvGrpSpPr/>
+        <p:nvPr/>
+      </p:nvGrpSpPr>
+      <p:grpSpPr>
+        <a:xfrm>
+          <a:off x="0" y="0"/>
+          <a:ext cx="0" cy="0"/>
+          <a:chOff x="0" y="0"/>
+          <a:chExt cx="0" cy="0"/>
+        </a:xfrm>
+      </p:grpSpPr>
+      <p:pic>
+        <p:nvPicPr>
+          <p:cNvPr id="7" name="Picture 6" descr="A screenshot of a computer&#10;&#10;Description automatically generated with low confidence">
+            <a:extLst>
+              <a:ext uri="{FF2B5EF4-FFF2-40B4-BE49-F238E27FC236}">
+                <a16:creationId xmlns:a16="http://schemas.microsoft.com/office/drawing/2014/main" id="{15323F57-2A37-E932-EDD4-46E0D1D05940}"/>
+              </a:ext>
+            </a:extLst>
+          </p:cNvPr>
+          <p:cNvPicPr>
+            <a:picLocks noChangeAspect="1"/>
+          </p:cNvPicPr>
+          <p:nvPr/>
+        </p:nvPicPr>
+        <p:blipFill>
+          <a:blip r:embed="rId2"/>
+          <a:stretch>
+            <a:fillRect/>
+          </a:stretch>
+        </p:blipFill>
+        <p:spPr>
+          <a:xfrm>
+            <a:off x="85421" y="0"/>
+            <a:ext cx="12021157" cy="6858000"/>
+          </a:xfrm>
+          <a:prstGeom prst="rect">
+            <a:avLst/>
+          </a:prstGeom>
+        </p:spPr>
+      </p:pic>
+    </p:spTree>
+    <p:extLst>
+      <p:ext uri="{BB962C8B-B14F-4D97-AF65-F5344CB8AC3E}">
+        <p14:creationId xmlns:p14="http://schemas.microsoft.com/office/powerpoint/2010/main" val="494687895"/>
+      </p:ext>
+    </p:extLst>
+  </p:cSld>
+  <p:clrMapOvr>
+    <a:masterClrMapping/>
+  </p:clrMapOvr>
+</p:sld>
+</file>
+
+<file path=ppt/slides/slide19.xml><?xml version="1.0" encoding="utf-8"?>
+<p:sld xmlns:a="http://schemas.openxmlformats.org/drawingml/2006/main" xmlns:r="http://schemas.openxmlformats.org/officeDocument/2006/relationships" xmlns:p="http://schemas.openxmlformats.org/presentationml/2006/main">
+  <p:cSld>
+    <p:spTree>
+      <p:nvGrpSpPr>
+        <p:cNvPr id="1" name=""/>
+        <p:cNvGrpSpPr/>
+        <p:nvPr/>
+      </p:nvGrpSpPr>
+      <p:grpSpPr>
+        <a:xfrm>
+          <a:off x="0" y="0"/>
+          <a:ext cx="0" cy="0"/>
+          <a:chOff x="0" y="0"/>
+          <a:chExt cx="0" cy="0"/>
+        </a:xfrm>
+      </p:grpSpPr>
+      <p:sp>
+        <p:nvSpPr>
+          <p:cNvPr id="2" name="Title 1">
+            <a:extLst>
+              <a:ext uri="{FF2B5EF4-FFF2-40B4-BE49-F238E27FC236}">
                 <a16:creationId xmlns:a16="http://schemas.microsoft.com/office/drawing/2014/main" id="{1BF09386-9A5D-A21B-E0E3-EED0C3D14BF1}"/>
               </a:ext>
             </a:extLst>
@@ -5781,12 +6394,90 @@
             <p:ph idx="1"/>
           </p:nvPr>
         </p:nvSpPr>
-        <p:spPr/>
-        <p:txBody>
-          <a:bodyPr/>
+        <p:spPr>
+          <a:xfrm>
+            <a:off x="1066800" y="1926336"/>
+            <a:ext cx="10058400" cy="3340608"/>
+          </a:xfrm>
+        </p:spPr>
+        <p:txBody>
+          <a:bodyPr>
+            <a:normAutofit/>
+          </a:bodyPr>
           <a:lstStyle/>
           <a:p>
-            <a:endParaRPr lang="en-US"/>
+            <a:r>
+              <a:rPr lang="en-US" sz="1600" dirty="0">
+                <a:latin typeface="Times New Roman" panose="02020603050405020304" pitchFamily="18" charset="0"/>
+                <a:cs typeface="Times New Roman" panose="02020603050405020304" pitchFamily="18" charset="0"/>
+              </a:rPr>
+              <a:t>Overall, we tried three different methods of classification to classify abalone’s rings based on 10 distinct attributes.</a:t>
+            </a:r>
+          </a:p>
+          <a:p>
+            <a:r>
+              <a:rPr lang="en-US" sz="1600" dirty="0">
+                <a:latin typeface="Times New Roman" panose="02020603050405020304" pitchFamily="18" charset="0"/>
+                <a:cs typeface="Times New Roman" panose="02020603050405020304" pitchFamily="18" charset="0"/>
+              </a:rPr>
+              <a:t>Although the attributes have high correlation with each other and average correlation with the target, we have applied multiple different methods to reduce the correlation between variables.</a:t>
+            </a:r>
+          </a:p>
+          <a:p>
+            <a:r>
+              <a:rPr lang="en-US" sz="1600" dirty="0">
+                <a:latin typeface="Times New Roman" panose="02020603050405020304" pitchFamily="18" charset="0"/>
+                <a:cs typeface="Times New Roman" panose="02020603050405020304" pitchFamily="18" charset="0"/>
+              </a:rPr>
+              <a:t>The result concludes:</a:t>
+            </a:r>
+          </a:p>
+          <a:p>
+            <a:pPr lvl="1"/>
+            <a:r>
+              <a:rPr lang="en-US" sz="1600" dirty="0">
+                <a:latin typeface="Times New Roman" panose="02020603050405020304" pitchFamily="18" charset="0"/>
+                <a:cs typeface="Times New Roman" panose="02020603050405020304" pitchFamily="18" charset="0"/>
+              </a:rPr>
+              <a:t>The worst performer is the decision tree model at training accuracy of 0.27 and testing accuracy at 0.23.</a:t>
+            </a:r>
+          </a:p>
+          <a:p>
+            <a:pPr lvl="1"/>
+            <a:r>
+              <a:rPr lang="en-US" sz="1600" dirty="0">
+                <a:latin typeface="Times New Roman" panose="02020603050405020304" pitchFamily="18" charset="0"/>
+                <a:cs typeface="Times New Roman" panose="02020603050405020304" pitchFamily="18" charset="0"/>
+              </a:rPr>
+              <a:t>The random forest model and the neural network model perform about the same. The two models both hover around 0.28 for training accuracy and 0.27 for testing accuracy.</a:t>
+            </a:r>
+          </a:p>
+          <a:p>
+            <a:r>
+              <a:rPr lang="en-US" sz="1600" dirty="0">
+                <a:latin typeface="Times New Roman" panose="02020603050405020304" pitchFamily="18" charset="0"/>
+                <a:cs typeface="Times New Roman" panose="02020603050405020304" pitchFamily="18" charset="0"/>
+              </a:rPr>
+              <a:t>All 3 models have low accuracy despite much effort into optimizing each model. Thus, we conclude classification is not the best method for the problem. </a:t>
+            </a:r>
+          </a:p>
+          <a:p>
+            <a:r>
+              <a:rPr lang="en-US" sz="1600" dirty="0">
+                <a:latin typeface="Times New Roman" panose="02020603050405020304" pitchFamily="18" charset="0"/>
+                <a:cs typeface="Times New Roman" panose="02020603050405020304" pitchFamily="18" charset="0"/>
+              </a:rPr>
+              <a:t>Instead, regression is a better approach.</a:t>
+            </a:r>
+          </a:p>
+          <a:p>
+            <a:pPr marL="274320" lvl="1" indent="0">
+              <a:buNone/>
+            </a:pPr>
+            <a:endParaRPr lang="en-US" sz="1600" dirty="0">
+              <a:latin typeface="Times New Roman" panose="02020603050405020304" pitchFamily="18" charset="0"/>
+              <a:cs typeface="Times New Roman" panose="02020603050405020304" pitchFamily="18" charset="0"/>
+            </a:endParaRPr>
           </a:p>
         </p:txBody>
       </p:sp>
@@ -5950,7 +6641,7 @@
                   <a:spcPts val="600"/>
                 </a:spcAft>
               </a:pPr>
-              <a:t>5/7/23</a:t>
+              <a:t>5/7/2023</a:t>
             </a:fld>
             <a:endParaRPr lang="en-US"/>
           </a:p>
@@ -6082,6 +6773,393 @@
           <a:lstStyle/>
           <a:p>
             <a:r>
+              <a:rPr lang="en-US" sz="5000" dirty="0"/>
+              <a:t>Abalone data set</a:t>
+            </a:r>
+          </a:p>
+        </p:txBody>
+      </p:sp>
+      <p:pic>
+        <p:nvPicPr>
+          <p:cNvPr id="7" name="Content Placeholder 6">
+            <a:extLst>
+              <a:ext uri="{FF2B5EF4-FFF2-40B4-BE49-F238E27FC236}">
+                <a16:creationId xmlns:a16="http://schemas.microsoft.com/office/drawing/2014/main" id="{6D426DA3-58B4-8FB7-B398-F3700441F898}"/>
+              </a:ext>
+            </a:extLst>
+          </p:cNvPr>
+          <p:cNvPicPr>
+            <a:picLocks noGrp="1" noChangeAspect="1"/>
+          </p:cNvPicPr>
+          <p:nvPr>
+            <p:ph idx="1"/>
+          </p:nvPr>
+        </p:nvPicPr>
+        <p:blipFill>
+          <a:blip r:embed="rId2"/>
+          <a:stretch>
+            <a:fillRect/>
+          </a:stretch>
+        </p:blipFill>
+        <p:spPr>
+          <a:xfrm>
+            <a:off x="1226615" y="2447986"/>
+            <a:ext cx="9372600" cy="981014"/>
+          </a:xfrm>
+        </p:spPr>
+      </p:pic>
+      <p:sp>
+        <p:nvSpPr>
+          <p:cNvPr id="8" name="Content Placeholder 8">
+            <a:extLst>
+              <a:ext uri="{FF2B5EF4-FFF2-40B4-BE49-F238E27FC236}">
+                <a16:creationId xmlns:a16="http://schemas.microsoft.com/office/drawing/2014/main" id="{A49CA63F-DE0E-60E1-5BF8-AE22E769DA0E}"/>
+              </a:ext>
+            </a:extLst>
+          </p:cNvPr>
+          <p:cNvSpPr txBox="1">
+            <a:spLocks/>
+          </p:cNvSpPr>
+          <p:nvPr/>
+        </p:nvSpPr>
+        <p:spPr>
+          <a:xfrm>
+            <a:off x="1226615" y="3841139"/>
+            <a:ext cx="9372600" cy="1688240"/>
+          </a:xfrm>
+          <a:prstGeom prst="rect">
+            <a:avLst/>
+          </a:prstGeom>
+        </p:spPr>
+        <p:txBody>
+          <a:bodyPr vert="horz" lIns="91440" tIns="45720" rIns="91440" bIns="45720" rtlCol="0">
+            <a:normAutofit/>
+          </a:bodyPr>
+          <a:lstStyle>
+            <a:lvl1pPr marL="182880" indent="-182880" algn="l" defTabSz="914400" rtl="0" eaLnBrk="1" latinLnBrk="0" hangingPunct="1">
+              <a:lnSpc>
+                <a:spcPct val="90000"/>
+              </a:lnSpc>
+              <a:spcBef>
+                <a:spcPts val="1200"/>
+              </a:spcBef>
+              <a:buClr>
+                <a:schemeClr val="accent1">
+                  <a:lumMod val="75000"/>
+                </a:schemeClr>
+              </a:buClr>
+              <a:buSzPct val="85000"/>
+              <a:buFont typeface="Wingdings" pitchFamily="2" charset="2"/>
+              <a:buChar char="§"/>
+              <a:defRPr sz="2000" kern="1200">
+                <a:solidFill>
+                  <a:schemeClr val="tx1"/>
+                </a:solidFill>
+                <a:latin typeface="+mn-lt"/>
+                <a:ea typeface="+mn-ea"/>
+                <a:cs typeface="+mn-cs"/>
+              </a:defRPr>
+            </a:lvl1pPr>
+            <a:lvl2pPr marL="457200" indent="-182880" algn="l" defTabSz="914400" rtl="0" eaLnBrk="1" latinLnBrk="0" hangingPunct="1">
+              <a:lnSpc>
+                <a:spcPct val="90000"/>
+              </a:lnSpc>
+              <a:spcBef>
+                <a:spcPts val="400"/>
+              </a:spcBef>
+              <a:spcAft>
+                <a:spcPts val="200"/>
+              </a:spcAft>
+              <a:buClr>
+                <a:schemeClr val="accent1">
+                  <a:lumMod val="75000"/>
+                </a:schemeClr>
+              </a:buClr>
+              <a:buSzPct val="85000"/>
+              <a:buFont typeface="Wingdings" pitchFamily="2" charset="2"/>
+              <a:buChar char="§"/>
+              <a:defRPr sz="1800" kern="1200">
+                <a:solidFill>
+                  <a:schemeClr val="tx1"/>
+                </a:solidFill>
+                <a:latin typeface="+mn-lt"/>
+                <a:ea typeface="+mn-ea"/>
+                <a:cs typeface="+mn-cs"/>
+              </a:defRPr>
+            </a:lvl2pPr>
+            <a:lvl3pPr marL="731520" indent="-182880" algn="l" defTabSz="914400" rtl="0" eaLnBrk="1" latinLnBrk="0" hangingPunct="1">
+              <a:lnSpc>
+                <a:spcPct val="90000"/>
+              </a:lnSpc>
+              <a:spcBef>
+                <a:spcPts val="400"/>
+              </a:spcBef>
+              <a:spcAft>
+                <a:spcPts val="200"/>
+              </a:spcAft>
+              <a:buClr>
+                <a:schemeClr val="accent1">
+                  <a:lumMod val="75000"/>
+                </a:schemeClr>
+              </a:buClr>
+              <a:buSzPct val="85000"/>
+              <a:buFont typeface="Wingdings" pitchFamily="2" charset="2"/>
+              <a:buChar char="§"/>
+              <a:defRPr sz="1600" kern="1200">
+                <a:solidFill>
+                  <a:schemeClr val="tx1"/>
+                </a:solidFill>
+                <a:latin typeface="+mn-lt"/>
+                <a:ea typeface="+mn-ea"/>
+                <a:cs typeface="+mn-cs"/>
+              </a:defRPr>
+            </a:lvl3pPr>
+            <a:lvl4pPr marL="1005840" indent="-182880" algn="l" defTabSz="914400" rtl="0" eaLnBrk="1" latinLnBrk="0" hangingPunct="1">
+              <a:lnSpc>
+                <a:spcPct val="90000"/>
+              </a:lnSpc>
+              <a:spcBef>
+                <a:spcPts val="400"/>
+              </a:spcBef>
+              <a:spcAft>
+                <a:spcPts val="200"/>
+              </a:spcAft>
+              <a:buClr>
+                <a:schemeClr val="accent1">
+                  <a:lumMod val="75000"/>
+                </a:schemeClr>
+              </a:buClr>
+              <a:buSzPct val="85000"/>
+              <a:buFont typeface="Wingdings" pitchFamily="2" charset="2"/>
+              <a:buChar char="§"/>
+              <a:defRPr sz="1600" kern="1200">
+                <a:solidFill>
+                  <a:schemeClr val="tx1"/>
+                </a:solidFill>
+                <a:latin typeface="+mn-lt"/>
+                <a:ea typeface="+mn-ea"/>
+                <a:cs typeface="+mn-cs"/>
+              </a:defRPr>
+            </a:lvl4pPr>
+            <a:lvl5pPr marL="1280160" indent="-182880" algn="l" defTabSz="914400" rtl="0" eaLnBrk="1" latinLnBrk="0" hangingPunct="1">
+              <a:lnSpc>
+                <a:spcPct val="90000"/>
+              </a:lnSpc>
+              <a:spcBef>
+                <a:spcPts val="400"/>
+              </a:spcBef>
+              <a:spcAft>
+                <a:spcPts val="200"/>
+              </a:spcAft>
+              <a:buClr>
+                <a:schemeClr val="accent1">
+                  <a:lumMod val="75000"/>
+                </a:schemeClr>
+              </a:buClr>
+              <a:buSzPct val="85000"/>
+              <a:buFont typeface="Wingdings" pitchFamily="2" charset="2"/>
+              <a:buChar char="§"/>
+              <a:defRPr sz="1600" kern="1200">
+                <a:solidFill>
+                  <a:schemeClr val="tx1"/>
+                </a:solidFill>
+                <a:latin typeface="+mn-lt"/>
+                <a:ea typeface="+mn-ea"/>
+                <a:cs typeface="+mn-cs"/>
+              </a:defRPr>
+            </a:lvl5pPr>
+            <a:lvl6pPr marL="1600000" indent="-228600" algn="l" defTabSz="914400" rtl="0" eaLnBrk="1" latinLnBrk="0" hangingPunct="1">
+              <a:lnSpc>
+                <a:spcPct val="90000"/>
+              </a:lnSpc>
+              <a:spcBef>
+                <a:spcPts val="400"/>
+              </a:spcBef>
+              <a:spcAft>
+                <a:spcPts val="200"/>
+              </a:spcAft>
+              <a:buClr>
+                <a:schemeClr val="accent1">
+                  <a:lumMod val="75000"/>
+                </a:schemeClr>
+              </a:buClr>
+              <a:buSzPct val="85000"/>
+              <a:buFont typeface="Wingdings" pitchFamily="2" charset="2"/>
+              <a:buChar char="§"/>
+              <a:defRPr sz="1600" kern="1200">
+                <a:solidFill>
+                  <a:schemeClr val="tx1"/>
+                </a:solidFill>
+                <a:latin typeface="+mn-lt"/>
+                <a:ea typeface="+mn-ea"/>
+                <a:cs typeface="+mn-cs"/>
+              </a:defRPr>
+            </a:lvl6pPr>
+            <a:lvl7pPr marL="1900000" indent="-228600" algn="l" defTabSz="914400" rtl="0" eaLnBrk="1" latinLnBrk="0" hangingPunct="1">
+              <a:lnSpc>
+                <a:spcPct val="90000"/>
+              </a:lnSpc>
+              <a:spcBef>
+                <a:spcPts val="400"/>
+              </a:spcBef>
+              <a:spcAft>
+                <a:spcPts val="200"/>
+              </a:spcAft>
+              <a:buClr>
+                <a:schemeClr val="accent1">
+                  <a:lumMod val="75000"/>
+                </a:schemeClr>
+              </a:buClr>
+              <a:buSzPct val="85000"/>
+              <a:buFont typeface="Wingdings" pitchFamily="2" charset="2"/>
+              <a:buChar char="§"/>
+              <a:defRPr sz="1600" kern="1200">
+                <a:solidFill>
+                  <a:schemeClr val="tx1"/>
+                </a:solidFill>
+                <a:latin typeface="+mn-lt"/>
+                <a:ea typeface="+mn-ea"/>
+                <a:cs typeface="+mn-cs"/>
+              </a:defRPr>
+            </a:lvl7pPr>
+            <a:lvl8pPr marL="2200000" indent="-228600" algn="l" defTabSz="914400" rtl="0" eaLnBrk="1" latinLnBrk="0" hangingPunct="1">
+              <a:lnSpc>
+                <a:spcPct val="90000"/>
+              </a:lnSpc>
+              <a:spcBef>
+                <a:spcPts val="400"/>
+              </a:spcBef>
+              <a:spcAft>
+                <a:spcPts val="200"/>
+              </a:spcAft>
+              <a:buClr>
+                <a:schemeClr val="accent1">
+                  <a:lumMod val="75000"/>
+                </a:schemeClr>
+              </a:buClr>
+              <a:buSzPct val="85000"/>
+              <a:buFont typeface="Wingdings" pitchFamily="2" charset="2"/>
+              <a:buChar char="§"/>
+              <a:defRPr sz="1600" kern="1200">
+                <a:solidFill>
+                  <a:schemeClr val="tx1"/>
+                </a:solidFill>
+                <a:latin typeface="+mn-lt"/>
+                <a:ea typeface="+mn-ea"/>
+                <a:cs typeface="+mn-cs"/>
+              </a:defRPr>
+            </a:lvl8pPr>
+            <a:lvl9pPr marL="2500000" indent="-228600" algn="l" defTabSz="914400" rtl="0" eaLnBrk="1" latinLnBrk="0" hangingPunct="1">
+              <a:lnSpc>
+                <a:spcPct val="90000"/>
+              </a:lnSpc>
+              <a:spcBef>
+                <a:spcPts val="400"/>
+              </a:spcBef>
+              <a:spcAft>
+                <a:spcPts val="200"/>
+              </a:spcAft>
+              <a:buClr>
+                <a:schemeClr val="accent1">
+                  <a:lumMod val="75000"/>
+                </a:schemeClr>
+              </a:buClr>
+              <a:buSzPct val="85000"/>
+              <a:buFont typeface="Wingdings" pitchFamily="2" charset="2"/>
+              <a:buChar char="§"/>
+              <a:defRPr sz="1600" kern="1200">
+                <a:solidFill>
+                  <a:schemeClr val="tx1"/>
+                </a:solidFill>
+                <a:latin typeface="+mn-lt"/>
+                <a:ea typeface="+mn-ea"/>
+                <a:cs typeface="+mn-cs"/>
+              </a:defRPr>
+            </a:lvl9pPr>
+          </a:lstStyle>
+          <a:p>
+            <a:r>
+              <a:rPr lang="en-US" sz="1400" dirty="0">
+                <a:latin typeface="Times New Roman" panose="02020603050405020304" pitchFamily="18" charset="0"/>
+                <a:cs typeface="Times New Roman" panose="02020603050405020304" pitchFamily="18" charset="0"/>
+              </a:rPr>
+              <a:t>Abalone set on UCI website.</a:t>
+            </a:r>
+          </a:p>
+          <a:p>
+            <a:r>
+              <a:rPr lang="en-US" sz="1400" dirty="0">
+                <a:latin typeface="Times New Roman" panose="02020603050405020304" pitchFamily="18" charset="0"/>
+                <a:cs typeface="Times New Roman" panose="02020603050405020304" pitchFamily="18" charset="0"/>
+              </a:rPr>
+              <a:t>Default task is classification which is the method we have chosen to categorize Abalone’s rings.</a:t>
+            </a:r>
+          </a:p>
+          <a:p>
+            <a:r>
+              <a:rPr lang="en-US" sz="1400" dirty="0">
+                <a:latin typeface="Times New Roman" panose="02020603050405020304" pitchFamily="18" charset="0"/>
+                <a:cs typeface="Times New Roman" panose="02020603050405020304" pitchFamily="18" charset="0"/>
+              </a:rPr>
+              <a:t>The three classification methods we chose are: Decision Tree, Random Forest, and Neural Network.</a:t>
+            </a:r>
+          </a:p>
+        </p:txBody>
+      </p:sp>
+    </p:spTree>
+    <p:extLst>
+      <p:ext uri="{BB962C8B-B14F-4D97-AF65-F5344CB8AC3E}">
+        <p14:creationId xmlns:p14="http://schemas.microsoft.com/office/powerpoint/2010/main" val="370609322"/>
+      </p:ext>
+    </p:extLst>
+  </p:cSld>
+  <p:clrMapOvr>
+    <a:masterClrMapping/>
+  </p:clrMapOvr>
+</p:sld>
+</file>
+
+<file path=ppt/slides/slide4.xml><?xml version="1.0" encoding="utf-8"?>
+<p:sld xmlns:a="http://schemas.openxmlformats.org/drawingml/2006/main" xmlns:r="http://schemas.openxmlformats.org/officeDocument/2006/relationships" xmlns:p="http://schemas.openxmlformats.org/presentationml/2006/main">
+  <p:cSld>
+    <p:spTree>
+      <p:nvGrpSpPr>
+        <p:cNvPr id="1" name=""/>
+        <p:cNvGrpSpPr/>
+        <p:nvPr/>
+      </p:nvGrpSpPr>
+      <p:grpSpPr>
+        <a:xfrm>
+          <a:off x="0" y="0"/>
+          <a:ext cx="0" cy="0"/>
+          <a:chOff x="0" y="0"/>
+          <a:chExt cx="0" cy="0"/>
+        </a:xfrm>
+      </p:grpSpPr>
+      <p:sp>
+        <p:nvSpPr>
+          <p:cNvPr id="2" name="Title 1">
+            <a:extLst>
+              <a:ext uri="{FF2B5EF4-FFF2-40B4-BE49-F238E27FC236}">
+                <a16:creationId xmlns:a16="http://schemas.microsoft.com/office/drawing/2014/main" id="{85045044-B935-E887-5E26-64918049B2EB}"/>
+              </a:ext>
+            </a:extLst>
+          </p:cNvPr>
+          <p:cNvSpPr>
+            <a:spLocks noGrp="1"/>
+          </p:cNvSpPr>
+          <p:nvPr>
+            <p:ph type="title"/>
+          </p:nvPr>
+        </p:nvSpPr>
+        <p:spPr/>
+        <p:txBody>
+          <a:bodyPr>
+            <a:normAutofit/>
+          </a:bodyPr>
+          <a:lstStyle/>
+          <a:p>
+            <a:r>
               <a:rPr lang="en-US" sz="5000" dirty="0" err="1"/>
               <a:t>aBOUT</a:t>
             </a:r>
@@ -6134,7 +7212,7 @@
 </p:sld>
 </file>
 
-<file path=ppt/slides/slide4.xml><?xml version="1.0" encoding="utf-8"?>
+<file path=ppt/slides/slide5.xml><?xml version="1.0" encoding="utf-8"?>
 <p:sld xmlns:a="http://schemas.openxmlformats.org/drawingml/2006/main" xmlns:r="http://schemas.openxmlformats.org/officeDocument/2006/relationships" xmlns:p="http://schemas.openxmlformats.org/presentationml/2006/main">
   <p:cSld>
     <p:spTree>
@@ -6221,7 +7299,7 @@
 </p:sld>
 </file>
 
-<file path=ppt/slides/slide5.xml><?xml version="1.0" encoding="utf-8"?>
+<file path=ppt/slides/slide6.xml><?xml version="1.0" encoding="utf-8"?>
 <p:sld xmlns:a="http://schemas.openxmlformats.org/drawingml/2006/main" xmlns:r="http://schemas.openxmlformats.org/officeDocument/2006/relationships" xmlns:p="http://schemas.openxmlformats.org/presentationml/2006/main">
   <p:cSld>
     <p:bg>
@@ -6449,7 +7527,7 @@
 </p:sld>
 </file>
 
-<file path=ppt/slides/slide6.xml><?xml version="1.0" encoding="utf-8"?>
+<file path=ppt/slides/slide7.xml><?xml version="1.0" encoding="utf-8"?>
 <p:sld xmlns:a="http://schemas.openxmlformats.org/drawingml/2006/main" xmlns:r="http://schemas.openxmlformats.org/officeDocument/2006/relationships" xmlns:p="http://schemas.openxmlformats.org/presentationml/2006/main">
   <p:cSld>
     <p:spTree>
@@ -6538,7 +7616,7 @@
 </p:sld>
 </file>
 
-<file path=ppt/slides/slide7.xml><?xml version="1.0" encoding="utf-8"?>
+<file path=ppt/slides/slide8.xml><?xml version="1.0" encoding="utf-8"?>
 <p:sld xmlns:a="http://schemas.openxmlformats.org/drawingml/2006/main" xmlns:r="http://schemas.openxmlformats.org/officeDocument/2006/relationships" xmlns:p="http://schemas.openxmlformats.org/presentationml/2006/main">
   <p:cSld>
     <p:spTree>
@@ -6670,7 +7748,7 @@
 </p:sld>
 </file>
 
-<file path=ppt/slides/slide8.xml><?xml version="1.0" encoding="utf-8"?>
+<file path=ppt/slides/slide9.xml><?xml version="1.0" encoding="utf-8"?>
 <p:sld xmlns:a="http://schemas.openxmlformats.org/drawingml/2006/main" xmlns:r="http://schemas.openxmlformats.org/officeDocument/2006/relationships" xmlns:p="http://schemas.openxmlformats.org/presentationml/2006/main">
   <p:cSld>
     <p:bg>
@@ -6861,93 +7939,6 @@
     <p:extLst>
       <p:ext uri="{BB962C8B-B14F-4D97-AF65-F5344CB8AC3E}">
         <p14:creationId xmlns:p14="http://schemas.microsoft.com/office/powerpoint/2010/main" val="1945635295"/>
-      </p:ext>
-    </p:extLst>
-  </p:cSld>
-  <p:clrMapOvr>
-    <a:masterClrMapping/>
-  </p:clrMapOvr>
-</p:sld>
-</file>
-
-<file path=ppt/slides/slide9.xml><?xml version="1.0" encoding="utf-8"?>
-<p:sld xmlns:a="http://schemas.openxmlformats.org/drawingml/2006/main" xmlns:r="http://schemas.openxmlformats.org/officeDocument/2006/relationships" xmlns:p="http://schemas.openxmlformats.org/presentationml/2006/main">
-  <p:cSld>
-    <p:spTree>
-      <p:nvGrpSpPr>
-        <p:cNvPr id="1" name=""/>
-        <p:cNvGrpSpPr/>
-        <p:nvPr/>
-      </p:nvGrpSpPr>
-      <p:grpSpPr>
-        <a:xfrm>
-          <a:off x="0" y="0"/>
-          <a:ext cx="0" cy="0"/>
-          <a:chOff x="0" y="0"/>
-          <a:chExt cx="0" cy="0"/>
-        </a:xfrm>
-      </p:grpSpPr>
-      <p:sp>
-        <p:nvSpPr>
-          <p:cNvPr id="2" name="Title 1">
-            <a:extLst>
-              <a:ext uri="{FF2B5EF4-FFF2-40B4-BE49-F238E27FC236}">
-                <a16:creationId xmlns:a16="http://schemas.microsoft.com/office/drawing/2014/main" id="{3278CA32-D526-A982-E1FB-E4618AB9AED5}"/>
-              </a:ext>
-            </a:extLst>
-          </p:cNvPr>
-          <p:cNvSpPr>
-            <a:spLocks noGrp="1"/>
-          </p:cNvSpPr>
-          <p:nvPr>
-            <p:ph type="title"/>
-          </p:nvPr>
-        </p:nvSpPr>
-        <p:spPr/>
-        <p:txBody>
-          <a:bodyPr/>
-          <a:lstStyle/>
-          <a:p>
-            <a:r>
-              <a:rPr lang="en-US" dirty="0" err="1"/>
-              <a:t>iDENTIFYING</a:t>
-            </a:r>
-            <a:r>
-              <a:rPr lang="en-US" dirty="0"/>
-              <a:t> OUTLIERS</a:t>
-            </a:r>
-          </a:p>
-        </p:txBody>
-      </p:sp>
-      <p:sp>
-        <p:nvSpPr>
-          <p:cNvPr id="3" name="Content Placeholder 2">
-            <a:extLst>
-              <a:ext uri="{FF2B5EF4-FFF2-40B4-BE49-F238E27FC236}">
-                <a16:creationId xmlns:a16="http://schemas.microsoft.com/office/drawing/2014/main" id="{17240ACD-067A-F848-3734-873FB48D0E8C}"/>
-              </a:ext>
-            </a:extLst>
-          </p:cNvPr>
-          <p:cNvSpPr>
-            <a:spLocks noGrp="1"/>
-          </p:cNvSpPr>
-          <p:nvPr>
-            <p:ph idx="1"/>
-          </p:nvPr>
-        </p:nvSpPr>
-        <p:spPr/>
-        <p:txBody>
-          <a:bodyPr/>
-          <a:lstStyle/>
-          <a:p>
-            <a:endParaRPr lang="en-US"/>
-          </a:p>
-        </p:txBody>
-      </p:sp>
-    </p:spTree>
-    <p:extLst>
-      <p:ext uri="{BB962C8B-B14F-4D97-AF65-F5344CB8AC3E}">
-        <p14:creationId xmlns:p14="http://schemas.microsoft.com/office/powerpoint/2010/main" val="2167812012"/>
       </p:ext>
     </p:extLst>
   </p:cSld>

</xml_diff>